<commit_message>
Finalized initial presentation. Added videos.
</commit_message>
<xml_diff>
--- a/present/Impact Alert System.pptx
+++ b/present/Impact Alert System.pptx
@@ -3778,7 +3778,6 @@
               <a:rPr lang="en-US" dirty="0" smtClean="0"/>
               <a:t>Optical flow </a:t>
             </a:r>
-            <a:endParaRPr lang="en-US" dirty="0" smtClean="0"/>
           </a:p>
           <a:p>
             <a:pPr lvl="1"/>
@@ -3790,7 +3789,6 @@
               <a:rPr lang="en-US" dirty="0" smtClean="0"/>
               <a:t> filter</a:t>
             </a:r>
-            <a:endParaRPr lang="en-US" dirty="0" smtClean="0"/>
           </a:p>
           <a:p>
             <a:r>
@@ -3804,7 +3802,6 @@
               <a:rPr lang="en-US" dirty="0" smtClean="0"/>
               <a:t>Markov model</a:t>
             </a:r>
-            <a:endParaRPr lang="en-US" dirty="0" smtClean="0"/>
           </a:p>
           <a:p>
             <a:r>
@@ -3942,8 +3939,24 @@
             <a:pPr lvl="1"/>
             <a:r>
               <a:rPr lang="en-US" dirty="0" smtClean="0"/>
-              <a:t>Generated code to microcontroller or port to mobile</a:t>
-            </a:r>
+              <a:t>Generated code to </a:t>
+            </a:r>
+            <a:r>
+              <a:rPr lang="en-US" dirty="0" smtClean="0"/>
+              <a:t>microcontroller, port </a:t>
+            </a:r>
+            <a:r>
+              <a:rPr lang="en-US" dirty="0" smtClean="0"/>
+              <a:t>to </a:t>
+            </a:r>
+            <a:r>
+              <a:rPr lang="en-US" dirty="0" smtClean="0"/>
+              <a:t>mobile, or C#</a:t>
+            </a:r>
+          </a:p>
+          <a:p>
+            <a:pPr lvl="1"/>
+            <a:endParaRPr lang="en-US" dirty="0" smtClean="0"/>
           </a:p>
           <a:p>
             <a:r>
@@ -3970,8 +3983,13 @@
             <a:pPr lvl="1"/>
             <a:r>
               <a:rPr lang="en-US" dirty="0" smtClean="0"/>
-              <a:t>PC/Mac or Microcontroller</a:t>
-            </a:r>
+              <a:t>PC/</a:t>
+            </a:r>
+            <a:r>
+              <a:rPr lang="en-US" dirty="0" smtClean="0"/>
+              <a:t>Mac, Microcontroller, or Mobile</a:t>
+            </a:r>
+            <a:endParaRPr lang="en-US" dirty="0" smtClean="0"/>
           </a:p>
           <a:p>
             <a:pPr lvl="1"/>
@@ -3984,8 +4002,13 @@
             <a:pPr lvl="1"/>
             <a:r>
               <a:rPr lang="en-US" dirty="0" smtClean="0"/>
-              <a:t>Special ball</a:t>
-            </a:r>
+              <a:t>Special </a:t>
+            </a:r>
+            <a:r>
+              <a:rPr lang="en-US" dirty="0" smtClean="0"/>
+              <a:t>ball (bright green)</a:t>
+            </a:r>
+            <a:endParaRPr lang="en-US" dirty="0" smtClean="0"/>
           </a:p>
           <a:p>
             <a:pPr lvl="1"/>
@@ -4018,8 +4041,8 @@
         </p:blipFill>
         <p:spPr>
           <a:xfrm>
-            <a:off x="5018886" y="3200400"/>
-            <a:ext cx="4125113" cy="3657600"/>
+            <a:off x="5448585" y="3581400"/>
+            <a:ext cx="3695414" cy="3276600"/>
           </a:xfrm>
           <a:prstGeom prst="rect">
             <a:avLst/>
@@ -4271,8 +4294,8 @@
         </p:nvSpPr>
         <p:spPr>
           <a:xfrm>
-            <a:off x="457200" y="1600200"/>
-            <a:ext cx="4114800" cy="4876800"/>
+            <a:off x="457200" y="1371600"/>
+            <a:ext cx="8229600" cy="5105400"/>
           </a:xfrm>
         </p:spPr>
         <p:txBody>
@@ -4290,7 +4313,11 @@
             <a:pPr lvl="1"/>
             <a:r>
               <a:rPr lang="en-US" i="1" dirty="0" smtClean="0"/>
-              <a:t>Demonstration of tested scenarios</a:t>
+              <a:t>Demonstration of tested </a:t>
+            </a:r>
+            <a:r>
+              <a:rPr lang="en-US" i="1" dirty="0" smtClean="0"/>
+              <a:t>scenarios</a:t>
             </a:r>
           </a:p>
           <a:p>
@@ -4311,12 +4338,32 @@
           </a:p>
           <a:p>
             <a:pPr lvl="1"/>
+            <a:endParaRPr lang="en-US" i="1" dirty="0"/>
+          </a:p>
+          <a:p>
+            <a:pPr lvl="1"/>
             <a:endParaRPr lang="en-US" i="1" dirty="0" smtClean="0"/>
           </a:p>
           <a:p>
+            <a:pPr lvl="1"/>
+            <a:endParaRPr lang="en-US" i="1" dirty="0"/>
+          </a:p>
+          <a:p>
+            <a:pPr lvl="1"/>
+            <a:endParaRPr lang="en-US" i="1" dirty="0" smtClean="0"/>
+          </a:p>
+          <a:p>
+            <a:pPr lvl="1"/>
+            <a:endParaRPr lang="en-US" i="1" dirty="0" smtClean="0"/>
+          </a:p>
+          <a:p>
             <a:r>
               <a:rPr lang="en-US" i="1" dirty="0" smtClean="0"/>
-              <a:t>Live Demonstration</a:t>
+              <a:t>Live </a:t>
+            </a:r>
+            <a:r>
+              <a:rPr lang="en-US" i="1" dirty="0" smtClean="0"/>
+              <a:t>Demonstration</a:t>
             </a:r>
           </a:p>
           <a:p>
@@ -4333,28 +4380,64 @@
       </p:sp>
       <p:pic>
         <p:nvPicPr>
-          <p:cNvPr id="5" name="Picture 4" descr="Screen Shot 2015-02-04 at 7.01.19 PM.png"/>
+          <p:cNvPr id="4" name="soccer_ball4_orig-sameq.avi">
+            <a:hlinkClick r:id="" action="ppaction://media"/>
+          </p:cNvPr>
           <p:cNvPicPr>
             <a:picLocks noChangeAspect="1"/>
           </p:cNvPicPr>
-          <p:nvPr/>
+          <p:nvPr>
+            <a:videoFile r:link="rId2"/>
+            <p:extLst>
+              <p:ext uri="{DAA4B4D4-6D71-4841-9C94-3DE7FCFB9230}">
+                <p14:media xmlns:p14="http://schemas.microsoft.com/office/powerpoint/2010/main" r:embed="rId1"/>
+              </p:ext>
+            </p:extLst>
+          </p:nvPr>
         </p:nvPicPr>
         <p:blipFill>
-          <a:blip r:embed="rId2">
-            <a:extLst>
-              <a:ext uri="{28A0092B-C50C-407E-A947-70E740481C1C}">
-                <a14:useLocalDpi xmlns:a14="http://schemas.microsoft.com/office/drawing/2010/main" val="0"/>
-              </a:ext>
-            </a:extLst>
-          </a:blip>
+          <a:blip r:embed="rId6"/>
           <a:stretch>
             <a:fillRect/>
           </a:stretch>
         </p:blipFill>
         <p:spPr>
           <a:xfrm>
-            <a:off x="4572000" y="1371600"/>
-            <a:ext cx="4419600" cy="2921000"/>
+            <a:off x="609600" y="2362200"/>
+            <a:ext cx="3759200" cy="2819400"/>
+          </a:xfrm>
+          <a:prstGeom prst="rect">
+            <a:avLst/>
+          </a:prstGeom>
+        </p:spPr>
+      </p:pic>
+      <p:pic>
+        <p:nvPicPr>
+          <p:cNvPr id="6" name="soccer_ball4_thresh.avi">
+            <a:hlinkClick r:id="" action="ppaction://media"/>
+          </p:cNvPr>
+          <p:cNvPicPr>
+            <a:picLocks noChangeAspect="1"/>
+          </p:cNvPicPr>
+          <p:nvPr>
+            <a:videoFile r:link="rId4"/>
+            <p:extLst>
+              <p:ext uri="{DAA4B4D4-6D71-4841-9C94-3DE7FCFB9230}">
+                <p14:media xmlns:p14="http://schemas.microsoft.com/office/powerpoint/2010/main" r:embed="rId3"/>
+              </p:ext>
+            </p:extLst>
+          </p:nvPr>
+        </p:nvPicPr>
+        <p:blipFill>
+          <a:blip r:embed="rId7"/>
+          <a:stretch>
+            <a:fillRect/>
+          </a:stretch>
+        </p:blipFill>
+        <p:spPr>
+          <a:xfrm>
+            <a:off x="4953000" y="2362200"/>
+            <a:ext cx="3759200" cy="2819400"/>
           </a:xfrm>
           <a:prstGeom prst="rect">
             <a:avLst/>
@@ -4369,7 +4452,150 @@
   <p:timing>
     <p:tnLst>
       <p:par>
-        <p:cTn xmlns:p14="http://schemas.microsoft.com/office/powerpoint/2010/main" id="1" dur="indefinite" restart="never" nodeType="tmRoot"/>
+        <p:cTn xmlns:p14="http://schemas.microsoft.com/office/powerpoint/2010/main" id="1" dur="indefinite" restart="never" nodeType="tmRoot">
+          <p:childTnLst>
+            <p:seq concurrent="1" nextAc="seek">
+              <p:cTn id="2" restart="whenNotActive" fill="hold" evtFilter="cancelBubble" nodeType="interactiveSeq">
+                <p:stCondLst>
+                  <p:cond evt="onClick" delay="0">
+                    <p:tgtEl>
+                      <p:spTgt spid="4"/>
+                    </p:tgtEl>
+                  </p:cond>
+                </p:stCondLst>
+                <p:endSync evt="end" delay="0">
+                  <p:rtn val="all"/>
+                </p:endSync>
+                <p:childTnLst>
+                  <p:par>
+                    <p:cTn id="3" fill="hold">
+                      <p:stCondLst>
+                        <p:cond delay="0"/>
+                      </p:stCondLst>
+                      <p:childTnLst>
+                        <p:par>
+                          <p:cTn id="4" fill="hold">
+                            <p:stCondLst>
+                              <p:cond delay="0"/>
+                            </p:stCondLst>
+                            <p:childTnLst>
+                              <p:par>
+                                <p:cTn id="5" presetID="2" presetClass="mediacall" presetSubtype="0" fill="hold" nodeType="clickEffect">
+                                  <p:stCondLst>
+                                    <p:cond delay="0"/>
+                                  </p:stCondLst>
+                                  <p:childTnLst>
+                                    <p:cmd type="call" cmd="togglePause">
+                                      <p:cBhvr>
+                                        <p:cTn id="6" dur="1" fill="hold"/>
+                                        <p:tgtEl>
+                                          <p:spTgt spid="4"/>
+                                        </p:tgtEl>
+                                      </p:cBhvr>
+                                    </p:cmd>
+                                  </p:childTnLst>
+                                </p:cTn>
+                              </p:par>
+                            </p:childTnLst>
+                          </p:cTn>
+                        </p:par>
+                      </p:childTnLst>
+                    </p:cTn>
+                  </p:par>
+                </p:childTnLst>
+              </p:cTn>
+              <p:nextCondLst>
+                <p:cond evt="onClick" delay="0">
+                  <p:tgtEl>
+                    <p:spTgt spid="4"/>
+                  </p:tgtEl>
+                </p:cond>
+              </p:nextCondLst>
+            </p:seq>
+            <p:video>
+              <p:cMediaNode vol="80000" mute="1">
+                <p:cTn id="7" fill="hold" display="0">
+                  <p:stCondLst>
+                    <p:cond delay="indefinite"/>
+                  </p:stCondLst>
+                </p:cTn>
+                <p:tgtEl>
+                  <p:spTgt spid="4"/>
+                </p:tgtEl>
+              </p:cMediaNode>
+            </p:video>
+            <p:seq concurrent="1" nextAc="seek">
+              <p:cTn id="8" restart="whenNotActive" fill="hold" evtFilter="cancelBubble" nodeType="interactiveSeq">
+                <p:stCondLst>
+                  <p:cond evt="onClick" delay="0">
+                    <p:tgtEl>
+                      <p:spTgt spid="6"/>
+                    </p:tgtEl>
+                  </p:cond>
+                </p:stCondLst>
+                <p:endSync evt="end" delay="0">
+                  <p:rtn val="all"/>
+                </p:endSync>
+                <p:childTnLst>
+                  <p:par>
+                    <p:cTn id="9" fill="hold">
+                      <p:stCondLst>
+                        <p:cond delay="0"/>
+                      </p:stCondLst>
+                      <p:childTnLst>
+                        <p:par>
+                          <p:cTn id="10" fill="hold">
+                            <p:stCondLst>
+                              <p:cond delay="0"/>
+                            </p:stCondLst>
+                            <p:childTnLst>
+                              <p:par>
+                                <p:cTn id="11" presetID="2" presetClass="mediacall" presetSubtype="0" fill="hold" nodeType="clickEffect">
+                                  <p:stCondLst>
+                                    <p:cond delay="0"/>
+                                  </p:stCondLst>
+                                  <p:childTnLst>
+                                    <p:cmd type="call" cmd="togglePause">
+                                      <p:cBhvr>
+                                        <p:cTn id="12" dur="1" fill="hold"/>
+                                        <p:tgtEl>
+                                          <p:spTgt spid="6"/>
+                                        </p:tgtEl>
+                                      </p:cBhvr>
+                                    </p:cmd>
+                                  </p:childTnLst>
+                                </p:cTn>
+                              </p:par>
+                            </p:childTnLst>
+                          </p:cTn>
+                        </p:par>
+                      </p:childTnLst>
+                    </p:cTn>
+                  </p:par>
+                </p:childTnLst>
+              </p:cTn>
+              <p:nextCondLst>
+                <p:cond evt="onClick" delay="0">
+                  <p:tgtEl>
+                    <p:spTgt spid="6"/>
+                  </p:tgtEl>
+                </p:cond>
+              </p:nextCondLst>
+            </p:seq>
+            <p:video>
+              <p:cMediaNode vol="80000" mute="1">
+                <p:cTn id="13" fill="hold" display="0">
+                  <p:stCondLst>
+                    <p:cond delay="indefinite"/>
+                  </p:stCondLst>
+                </p:cTn>
+                <p:tgtEl>
+                  <p:spTgt spid="6"/>
+                </p:tgtEl>
+              </p:cMediaNode>
+            </p:video>
+          </p:childTnLst>
+        </p:cTn>
       </p:par>
     </p:tnLst>
   </p:timing>
@@ -4448,6 +4674,12 @@
             </a:r>
           </a:p>
           <a:p>
+            <a:pPr marL="274320" lvl="1" indent="0">
+              <a:buNone/>
+            </a:pPr>
+            <a:endParaRPr lang="en-US" dirty="0" smtClean="0"/>
+          </a:p>
+          <a:p>
             <a:pPr lvl="1"/>
             <a:endParaRPr lang="en-US" dirty="0" smtClean="0"/>
           </a:p>
@@ -4468,20 +4700,23 @@
             <a:pPr lvl="1"/>
             <a:r>
               <a:rPr lang="en-US" dirty="0" smtClean="0"/>
-              <a:t>Port to mobile </a:t>
-            </a:r>
+              <a:t>Port to mobile device</a:t>
+            </a:r>
+          </a:p>
+          <a:p>
+            <a:pPr lvl="1"/>
             <a:r>
               <a:rPr lang="en-US" dirty="0" smtClean="0"/>
-              <a:t>device</a:t>
-            </a:r>
-          </a:p>
-          <a:p>
-            <a:pPr lvl="1"/>
+              <a:t>Port to </a:t>
+            </a:r>
             <a:r>
               <a:rPr lang="en-US" dirty="0" smtClean="0"/>
-              <a:t>Port to C# or C environment</a:t>
-            </a:r>
-            <a:endParaRPr lang="en-US" dirty="0" smtClean="0"/>
+              <a:t>C </a:t>
+            </a:r>
+            <a:r>
+              <a:rPr lang="en-US" dirty="0" smtClean="0"/>
+              <a:t>environment</a:t>
+            </a:r>
           </a:p>
           <a:p>
             <a:pPr lvl="1"/>

</xml_diff>